<commit_message>
Añadi nuevas notas del curso
</commit_message>
<xml_diff>
--- a/Notas.pptx
+++ b/Notas.pptx
@@ -10,6 +10,10 @@
     <p:sldId id="258" r:id="rId4"/>
     <p:sldId id="259" r:id="rId5"/>
     <p:sldId id="260" r:id="rId6"/>
+    <p:sldId id="261" r:id="rId7"/>
+    <p:sldId id="262" r:id="rId8"/>
+    <p:sldId id="263" r:id="rId9"/>
+    <p:sldId id="264" r:id="rId10"/>
   </p:sldIdLst>
   <p:sldSz cx="12192000" cy="6858000"/>
   <p:notesSz cx="6858000" cy="9144000"/>
@@ -108,6 +112,11 @@
       </a:defRPr>
     </a:lvl9pPr>
   </p:defaultTextStyle>
+  <p:extLst>
+    <p:ext uri="{EFAFB233-063F-42B5-8137-9DF3F51BA10A}">
+      <p15:sldGuideLst xmlns:p15="http://schemas.microsoft.com/office/powerpoint/2012/main"/>
+    </p:ext>
+  </p:extLst>
 </p:presentation>
 </file>
 
@@ -250,7 +259,7 @@
           <a:p>
             <a:fld id="{48A87A34-81AB-432B-8DAE-1953F412C126}" type="datetimeFigureOut">
               <a:rPr lang="en-US" dirty="0"/>
-              <a:t>8/6/2020</a:t>
+              <a:t>8/11/2020</a:t>
             </a:fld>
             <a:endParaRPr lang="en-US" dirty="0"/>
           </a:p>
@@ -456,7 +465,7 @@
           <a:p>
             <a:fld id="{48A87A34-81AB-432B-8DAE-1953F412C126}" type="datetimeFigureOut">
               <a:rPr lang="en-US" dirty="0"/>
-              <a:t>8/6/2020</a:t>
+              <a:t>8/11/2020</a:t>
             </a:fld>
             <a:endParaRPr lang="en-US" dirty="0"/>
           </a:p>
@@ -666,7 +675,7 @@
           <a:p>
             <a:fld id="{48A87A34-81AB-432B-8DAE-1953F412C126}" type="datetimeFigureOut">
               <a:rPr lang="en-US" dirty="0"/>
-              <a:t>8/6/2020</a:t>
+              <a:t>8/11/2020</a:t>
             </a:fld>
             <a:endParaRPr lang="en-US" dirty="0"/>
           </a:p>
@@ -862,7 +871,7 @@
           <a:p>
             <a:fld id="{48A87A34-81AB-432B-8DAE-1953F412C126}" type="datetimeFigureOut">
               <a:rPr lang="en-US" dirty="0"/>
-              <a:t>8/6/2020</a:t>
+              <a:t>8/11/2020</a:t>
             </a:fld>
             <a:endParaRPr lang="en-US" dirty="0"/>
           </a:p>
@@ -1136,7 +1145,7 @@
           <a:p>
             <a:fld id="{48A87A34-81AB-432B-8DAE-1953F412C126}" type="datetimeFigureOut">
               <a:rPr lang="en-US" dirty="0"/>
-              <a:t>8/6/2020</a:t>
+              <a:t>8/11/2020</a:t>
             </a:fld>
             <a:endParaRPr lang="en-US" dirty="0"/>
           </a:p>
@@ -1399,7 +1408,7 @@
           <a:p>
             <a:fld id="{48A87A34-81AB-432B-8DAE-1953F412C126}" type="datetimeFigureOut">
               <a:rPr lang="en-US" dirty="0"/>
-              <a:t>8/6/2020</a:t>
+              <a:t>8/11/2020</a:t>
             </a:fld>
             <a:endParaRPr lang="en-US" dirty="0"/>
           </a:p>
@@ -1810,7 +1819,7 @@
           <a:p>
             <a:fld id="{48A87A34-81AB-432B-8DAE-1953F412C126}" type="datetimeFigureOut">
               <a:rPr lang="en-US" dirty="0"/>
-              <a:t>8/6/2020</a:t>
+              <a:t>8/11/2020</a:t>
             </a:fld>
             <a:endParaRPr lang="en-US" dirty="0"/>
           </a:p>
@@ -1954,7 +1963,7 @@
           <a:p>
             <a:fld id="{48A87A34-81AB-432B-8DAE-1953F412C126}" type="datetimeFigureOut">
               <a:rPr lang="en-US" dirty="0"/>
-              <a:t>8/6/2020</a:t>
+              <a:t>8/11/2020</a:t>
             </a:fld>
             <a:endParaRPr lang="en-US" dirty="0"/>
           </a:p>
@@ -2075,7 +2084,7 @@
           <a:p>
             <a:fld id="{48A87A34-81AB-432B-8DAE-1953F412C126}" type="datetimeFigureOut">
               <a:rPr lang="en-US" dirty="0"/>
-              <a:t>8/6/2020</a:t>
+              <a:t>8/11/2020</a:t>
             </a:fld>
             <a:endParaRPr lang="en-US" dirty="0"/>
           </a:p>
@@ -2321,7 +2330,7 @@
           <a:p>
             <a:fld id="{48A87A34-81AB-432B-8DAE-1953F412C126}" type="datetimeFigureOut">
               <a:rPr lang="en-US" dirty="0"/>
-              <a:t>8/6/2020</a:t>
+              <a:t>8/11/2020</a:t>
             </a:fld>
             <a:endParaRPr lang="en-US" dirty="0"/>
           </a:p>
@@ -2762,7 +2771,7 @@
             <a:fld id="{48A87A34-81AB-432B-8DAE-1953F412C126}" type="datetimeFigureOut">
               <a:rPr lang="en-US" dirty="0"/>
               <a:pPr/>
-              <a:t>8/6/2020</a:t>
+              <a:t>8/11/2020</a:t>
             </a:fld>
             <a:endParaRPr lang="en-US" dirty="0"/>
           </a:p>
@@ -3085,7 +3094,7 @@
             <a:fld id="{48A87A34-81AB-432B-8DAE-1953F412C126}" type="datetimeFigureOut">
               <a:rPr lang="en-US" dirty="0"/>
               <a:pPr/>
-              <a:t>8/6/2020</a:t>
+              <a:t>8/11/2020</a:t>
             </a:fld>
             <a:endParaRPr lang="en-US" dirty="0"/>
           </a:p>
@@ -4308,6 +4317,582 @@
 </p:sld>
 </file>
 
+<file path=ppt/slides/slide6.xml><?xml version="1.0" encoding="utf-8"?>
+<p:sld xmlns:a="http://schemas.openxmlformats.org/drawingml/2006/main" xmlns:r="http://schemas.openxmlformats.org/officeDocument/2006/relationships" xmlns:p="http://schemas.openxmlformats.org/presentationml/2006/main">
+  <p:cSld>
+    <p:bg>
+      <p:bgPr>
+        <a:gradFill rotWithShape="1">
+          <a:gsLst>
+            <a:gs pos="0">
+              <a:schemeClr val="bg2">
+                <a:tint val="94000"/>
+                <a:satMod val="80000"/>
+                <a:lumMod val="106000"/>
+              </a:schemeClr>
+            </a:gs>
+            <a:gs pos="100000">
+              <a:schemeClr val="bg2">
+                <a:shade val="80000"/>
+              </a:schemeClr>
+            </a:gs>
+          </a:gsLst>
+          <a:path path="circle">
+            <a:fillToRect l="43000" r="43000" b="100000"/>
+          </a:path>
+        </a:gradFill>
+        <a:effectLst/>
+      </p:bgPr>
+    </p:bg>
+    <p:spTree>
+      <p:nvGrpSpPr>
+        <p:cNvPr id="1" name=""/>
+        <p:cNvGrpSpPr/>
+        <p:nvPr/>
+      </p:nvGrpSpPr>
+      <p:grpSpPr>
+        <a:xfrm>
+          <a:off x="0" y="0"/>
+          <a:ext cx="0" cy="0"/>
+          <a:chOff x="0" y="0"/>
+          <a:chExt cx="0" cy="0"/>
+        </a:xfrm>
+      </p:grpSpPr>
+      <p:sp useBgFill="1">
+        <p:nvSpPr>
+          <p:cNvPr id="7" name="Rectangle 6">
+            <a:extLst>
+              <a:ext uri="{FF2B5EF4-FFF2-40B4-BE49-F238E27FC236}">
+                <a16:creationId xmlns:a16="http://schemas.microsoft.com/office/drawing/2014/main" id="{62C9703D-C8F9-44AD-A7C0-C2F3871F8C1B}"/>
+              </a:ext>
+              <a:ext uri="{C183D7F6-B498-43B3-948B-1728B52AA6E4}">
+                <adec:decorative xmlns:adec="http://schemas.microsoft.com/office/drawing/2017/decorative" val="1"/>
+              </a:ext>
+            </a:extLst>
+          </p:cNvPr>
+          <p:cNvSpPr>
+            <a:spLocks noGrp="1" noRot="1" noChangeAspect="1" noMove="1" noResize="1" noEditPoints="1" noAdjustHandles="1" noChangeArrowheads="1" noChangeShapeType="1" noTextEdit="1"/>
+          </p:cNvSpPr>
+          <p:nvPr>
+            <p:extLst>
+              <p:ext uri="{386F3935-93C4-4BCD-93E2-E3B085C9AB24}">
+                <p16:designElem xmlns:p16="http://schemas.microsoft.com/office/powerpoint/2015/main" val="1"/>
+              </p:ext>
+            </p:extLst>
+          </p:nvPr>
+        </p:nvSpPr>
+        <p:spPr>
+          <a:xfrm>
+            <a:off x="0" y="0"/>
+            <a:ext cx="12192000" cy="6160168"/>
+          </a:xfrm>
+          <a:prstGeom prst="rect">
+            <a:avLst/>
+          </a:prstGeom>
+          <a:ln>
+            <a:noFill/>
+          </a:ln>
+        </p:spPr>
+        <p:style>
+          <a:lnRef idx="2">
+            <a:schemeClr val="accent1">
+              <a:shade val="50000"/>
+            </a:schemeClr>
+          </a:lnRef>
+          <a:fillRef idx="1">
+            <a:schemeClr val="accent1"/>
+          </a:fillRef>
+          <a:effectRef idx="0">
+            <a:schemeClr val="accent1"/>
+          </a:effectRef>
+          <a:fontRef idx="minor">
+            <a:schemeClr val="lt1"/>
+          </a:fontRef>
+        </p:style>
+        <p:txBody>
+          <a:bodyPr rtlCol="0" anchor="ctr"/>
+          <a:lstStyle/>
+          <a:p>
+            <a:pPr algn="ctr"/>
+            <a:endParaRPr lang="en-US"/>
+          </a:p>
+        </p:txBody>
+      </p:sp>
+      <p:pic>
+        <p:nvPicPr>
+          <p:cNvPr id="2" name="Imagen 1">
+            <a:extLst>
+              <a:ext uri="{FF2B5EF4-FFF2-40B4-BE49-F238E27FC236}">
+                <a16:creationId xmlns:a16="http://schemas.microsoft.com/office/drawing/2014/main" id="{03C56337-4D04-470D-8DD9-FA9CE5ABB705}"/>
+              </a:ext>
+            </a:extLst>
+          </p:cNvPr>
+          <p:cNvPicPr>
+            <a:picLocks noChangeAspect="1"/>
+          </p:cNvPicPr>
+          <p:nvPr/>
+        </p:nvPicPr>
+        <p:blipFill>
+          <a:blip r:embed="rId2"/>
+          <a:stretch>
+            <a:fillRect/>
+          </a:stretch>
+        </p:blipFill>
+        <p:spPr>
+          <a:xfrm>
+            <a:off x="1764236" y="643467"/>
+            <a:ext cx="8663528" cy="4873234"/>
+          </a:xfrm>
+          <a:prstGeom prst="rect">
+            <a:avLst/>
+          </a:prstGeom>
+        </p:spPr>
+      </p:pic>
+    </p:spTree>
+    <p:extLst>
+      <p:ext uri="{BB962C8B-B14F-4D97-AF65-F5344CB8AC3E}">
+        <p14:creationId xmlns:p14="http://schemas.microsoft.com/office/powerpoint/2010/main" val="454327267"/>
+      </p:ext>
+    </p:extLst>
+  </p:cSld>
+  <p:clrMapOvr>
+    <a:masterClrMapping/>
+  </p:clrMapOvr>
+</p:sld>
+</file>
+
+<file path=ppt/slides/slide7.xml><?xml version="1.0" encoding="utf-8"?>
+<p:sld xmlns:a="http://schemas.openxmlformats.org/drawingml/2006/main" xmlns:r="http://schemas.openxmlformats.org/officeDocument/2006/relationships" xmlns:p="http://schemas.openxmlformats.org/presentationml/2006/main">
+  <p:cSld>
+    <p:bg>
+      <p:bgPr>
+        <a:gradFill rotWithShape="1">
+          <a:gsLst>
+            <a:gs pos="0">
+              <a:schemeClr val="bg2">
+                <a:tint val="94000"/>
+                <a:satMod val="80000"/>
+                <a:lumMod val="106000"/>
+              </a:schemeClr>
+            </a:gs>
+            <a:gs pos="100000">
+              <a:schemeClr val="bg2">
+                <a:shade val="80000"/>
+              </a:schemeClr>
+            </a:gs>
+          </a:gsLst>
+          <a:path path="circle">
+            <a:fillToRect l="43000" r="43000" b="100000"/>
+          </a:path>
+        </a:gradFill>
+        <a:effectLst/>
+      </p:bgPr>
+    </p:bg>
+    <p:spTree>
+      <p:nvGrpSpPr>
+        <p:cNvPr id="1" name=""/>
+        <p:cNvGrpSpPr/>
+        <p:nvPr/>
+      </p:nvGrpSpPr>
+      <p:grpSpPr>
+        <a:xfrm>
+          <a:off x="0" y="0"/>
+          <a:ext cx="0" cy="0"/>
+          <a:chOff x="0" y="0"/>
+          <a:chExt cx="0" cy="0"/>
+        </a:xfrm>
+      </p:grpSpPr>
+      <p:sp useBgFill="1">
+        <p:nvSpPr>
+          <p:cNvPr id="7" name="Rectangle 6">
+            <a:extLst>
+              <a:ext uri="{FF2B5EF4-FFF2-40B4-BE49-F238E27FC236}">
+                <a16:creationId xmlns:a16="http://schemas.microsoft.com/office/drawing/2014/main" id="{62C9703D-C8F9-44AD-A7C0-C2F3871F8C1B}"/>
+              </a:ext>
+              <a:ext uri="{C183D7F6-B498-43B3-948B-1728B52AA6E4}">
+                <adec:decorative xmlns:adec="http://schemas.microsoft.com/office/drawing/2017/decorative" val="1"/>
+              </a:ext>
+            </a:extLst>
+          </p:cNvPr>
+          <p:cNvSpPr>
+            <a:spLocks noGrp="1" noRot="1" noChangeAspect="1" noMove="1" noResize="1" noEditPoints="1" noAdjustHandles="1" noChangeArrowheads="1" noChangeShapeType="1" noTextEdit="1"/>
+          </p:cNvSpPr>
+          <p:nvPr>
+            <p:extLst>
+              <p:ext uri="{386F3935-93C4-4BCD-93E2-E3B085C9AB24}">
+                <p16:designElem xmlns:p16="http://schemas.microsoft.com/office/powerpoint/2015/main" val="1"/>
+              </p:ext>
+            </p:extLst>
+          </p:nvPr>
+        </p:nvSpPr>
+        <p:spPr>
+          <a:xfrm>
+            <a:off x="0" y="0"/>
+            <a:ext cx="12192000" cy="6160168"/>
+          </a:xfrm>
+          <a:prstGeom prst="rect">
+            <a:avLst/>
+          </a:prstGeom>
+          <a:ln>
+            <a:noFill/>
+          </a:ln>
+        </p:spPr>
+        <p:style>
+          <a:lnRef idx="2">
+            <a:schemeClr val="accent1">
+              <a:shade val="50000"/>
+            </a:schemeClr>
+          </a:lnRef>
+          <a:fillRef idx="1">
+            <a:schemeClr val="accent1"/>
+          </a:fillRef>
+          <a:effectRef idx="0">
+            <a:schemeClr val="accent1"/>
+          </a:effectRef>
+          <a:fontRef idx="minor">
+            <a:schemeClr val="lt1"/>
+          </a:fontRef>
+        </p:style>
+        <p:txBody>
+          <a:bodyPr rtlCol="0" anchor="ctr"/>
+          <a:lstStyle/>
+          <a:p>
+            <a:pPr algn="ctr"/>
+            <a:endParaRPr lang="en-US"/>
+          </a:p>
+        </p:txBody>
+      </p:sp>
+      <p:pic>
+        <p:nvPicPr>
+          <p:cNvPr id="2" name="Imagen 1">
+            <a:extLst>
+              <a:ext uri="{FF2B5EF4-FFF2-40B4-BE49-F238E27FC236}">
+                <a16:creationId xmlns:a16="http://schemas.microsoft.com/office/drawing/2014/main" id="{F79CCAF6-5B04-42E0-962F-0230450D1907}"/>
+              </a:ext>
+            </a:extLst>
+          </p:cNvPr>
+          <p:cNvPicPr>
+            <a:picLocks noChangeAspect="1"/>
+          </p:cNvPicPr>
+          <p:nvPr/>
+        </p:nvPicPr>
+        <p:blipFill>
+          <a:blip r:embed="rId2"/>
+          <a:stretch>
+            <a:fillRect/>
+          </a:stretch>
+        </p:blipFill>
+        <p:spPr>
+          <a:xfrm>
+            <a:off x="1764236" y="643467"/>
+            <a:ext cx="8663528" cy="4873234"/>
+          </a:xfrm>
+          <a:prstGeom prst="rect">
+            <a:avLst/>
+          </a:prstGeom>
+        </p:spPr>
+      </p:pic>
+    </p:spTree>
+    <p:extLst>
+      <p:ext uri="{BB962C8B-B14F-4D97-AF65-F5344CB8AC3E}">
+        <p14:creationId xmlns:p14="http://schemas.microsoft.com/office/powerpoint/2010/main" val="3464565663"/>
+      </p:ext>
+    </p:extLst>
+  </p:cSld>
+  <p:clrMapOvr>
+    <a:masterClrMapping/>
+  </p:clrMapOvr>
+</p:sld>
+</file>
+
+<file path=ppt/slides/slide8.xml><?xml version="1.0" encoding="utf-8"?>
+<p:sld xmlns:a="http://schemas.openxmlformats.org/drawingml/2006/main" xmlns:r="http://schemas.openxmlformats.org/officeDocument/2006/relationships" xmlns:p="http://schemas.openxmlformats.org/presentationml/2006/main">
+  <p:cSld>
+    <p:bg>
+      <p:bgPr>
+        <a:gradFill rotWithShape="1">
+          <a:gsLst>
+            <a:gs pos="0">
+              <a:schemeClr val="bg2">
+                <a:tint val="94000"/>
+                <a:satMod val="80000"/>
+                <a:lumMod val="106000"/>
+              </a:schemeClr>
+            </a:gs>
+            <a:gs pos="100000">
+              <a:schemeClr val="bg2">
+                <a:shade val="80000"/>
+              </a:schemeClr>
+            </a:gs>
+          </a:gsLst>
+          <a:path path="circle">
+            <a:fillToRect l="43000" r="43000" b="100000"/>
+          </a:path>
+        </a:gradFill>
+        <a:effectLst/>
+      </p:bgPr>
+    </p:bg>
+    <p:spTree>
+      <p:nvGrpSpPr>
+        <p:cNvPr id="1" name=""/>
+        <p:cNvGrpSpPr/>
+        <p:nvPr/>
+      </p:nvGrpSpPr>
+      <p:grpSpPr>
+        <a:xfrm>
+          <a:off x="0" y="0"/>
+          <a:ext cx="0" cy="0"/>
+          <a:chOff x="0" y="0"/>
+          <a:chExt cx="0" cy="0"/>
+        </a:xfrm>
+      </p:grpSpPr>
+      <p:sp useBgFill="1">
+        <p:nvSpPr>
+          <p:cNvPr id="7" name="Rectangle 6">
+            <a:extLst>
+              <a:ext uri="{FF2B5EF4-FFF2-40B4-BE49-F238E27FC236}">
+                <a16:creationId xmlns:a16="http://schemas.microsoft.com/office/drawing/2014/main" id="{62C9703D-C8F9-44AD-A7C0-C2F3871F8C1B}"/>
+              </a:ext>
+              <a:ext uri="{C183D7F6-B498-43B3-948B-1728B52AA6E4}">
+                <adec:decorative xmlns:adec="http://schemas.microsoft.com/office/drawing/2017/decorative" val="1"/>
+              </a:ext>
+            </a:extLst>
+          </p:cNvPr>
+          <p:cNvSpPr>
+            <a:spLocks noGrp="1" noRot="1" noChangeAspect="1" noMove="1" noResize="1" noEditPoints="1" noAdjustHandles="1" noChangeArrowheads="1" noChangeShapeType="1" noTextEdit="1"/>
+          </p:cNvSpPr>
+          <p:nvPr>
+            <p:extLst>
+              <p:ext uri="{386F3935-93C4-4BCD-93E2-E3B085C9AB24}">
+                <p16:designElem xmlns:p16="http://schemas.microsoft.com/office/powerpoint/2015/main" val="1"/>
+              </p:ext>
+            </p:extLst>
+          </p:nvPr>
+        </p:nvSpPr>
+        <p:spPr>
+          <a:xfrm>
+            <a:off x="0" y="0"/>
+            <a:ext cx="12192000" cy="6160168"/>
+          </a:xfrm>
+          <a:prstGeom prst="rect">
+            <a:avLst/>
+          </a:prstGeom>
+          <a:ln>
+            <a:noFill/>
+          </a:ln>
+        </p:spPr>
+        <p:style>
+          <a:lnRef idx="2">
+            <a:schemeClr val="accent1">
+              <a:shade val="50000"/>
+            </a:schemeClr>
+          </a:lnRef>
+          <a:fillRef idx="1">
+            <a:schemeClr val="accent1"/>
+          </a:fillRef>
+          <a:effectRef idx="0">
+            <a:schemeClr val="accent1"/>
+          </a:effectRef>
+          <a:fontRef idx="minor">
+            <a:schemeClr val="lt1"/>
+          </a:fontRef>
+        </p:style>
+        <p:txBody>
+          <a:bodyPr rtlCol="0" anchor="ctr"/>
+          <a:lstStyle/>
+          <a:p>
+            <a:pPr algn="ctr"/>
+            <a:endParaRPr lang="en-US"/>
+          </a:p>
+        </p:txBody>
+      </p:sp>
+      <p:pic>
+        <p:nvPicPr>
+          <p:cNvPr id="2" name="Imagen 1" descr="Captura de pantalla de un celular&#10;&#10;Descripción generada automáticamente">
+            <a:extLst>
+              <a:ext uri="{FF2B5EF4-FFF2-40B4-BE49-F238E27FC236}">
+                <a16:creationId xmlns:a16="http://schemas.microsoft.com/office/drawing/2014/main" id="{4C179D3B-FE9C-4352-8D70-281A61B917EA}"/>
+              </a:ext>
+            </a:extLst>
+          </p:cNvPr>
+          <p:cNvPicPr>
+            <a:picLocks noChangeAspect="1"/>
+          </p:cNvPicPr>
+          <p:nvPr/>
+        </p:nvPicPr>
+        <p:blipFill>
+          <a:blip r:embed="rId2"/>
+          <a:stretch>
+            <a:fillRect/>
+          </a:stretch>
+        </p:blipFill>
+        <p:spPr>
+          <a:xfrm>
+            <a:off x="1764236" y="643467"/>
+            <a:ext cx="8663528" cy="4873234"/>
+          </a:xfrm>
+          <a:prstGeom prst="rect">
+            <a:avLst/>
+          </a:prstGeom>
+        </p:spPr>
+      </p:pic>
+    </p:spTree>
+    <p:extLst>
+      <p:ext uri="{BB962C8B-B14F-4D97-AF65-F5344CB8AC3E}">
+        <p14:creationId xmlns:p14="http://schemas.microsoft.com/office/powerpoint/2010/main" val="64975455"/>
+      </p:ext>
+    </p:extLst>
+  </p:cSld>
+  <p:clrMapOvr>
+    <a:masterClrMapping/>
+  </p:clrMapOvr>
+</p:sld>
+</file>
+
+<file path=ppt/slides/slide9.xml><?xml version="1.0" encoding="utf-8"?>
+<p:sld xmlns:a="http://schemas.openxmlformats.org/drawingml/2006/main" xmlns:r="http://schemas.openxmlformats.org/officeDocument/2006/relationships" xmlns:p="http://schemas.openxmlformats.org/presentationml/2006/main">
+  <p:cSld>
+    <p:bg>
+      <p:bgPr>
+        <a:gradFill rotWithShape="1">
+          <a:gsLst>
+            <a:gs pos="0">
+              <a:schemeClr val="bg2">
+                <a:tint val="94000"/>
+                <a:satMod val="80000"/>
+                <a:lumMod val="106000"/>
+              </a:schemeClr>
+            </a:gs>
+            <a:gs pos="100000">
+              <a:schemeClr val="bg2">
+                <a:shade val="80000"/>
+              </a:schemeClr>
+            </a:gs>
+          </a:gsLst>
+          <a:path path="circle">
+            <a:fillToRect l="43000" r="43000" b="100000"/>
+          </a:path>
+        </a:gradFill>
+        <a:effectLst/>
+      </p:bgPr>
+    </p:bg>
+    <p:spTree>
+      <p:nvGrpSpPr>
+        <p:cNvPr id="1" name=""/>
+        <p:cNvGrpSpPr/>
+        <p:nvPr/>
+      </p:nvGrpSpPr>
+      <p:grpSpPr>
+        <a:xfrm>
+          <a:off x="0" y="0"/>
+          <a:ext cx="0" cy="0"/>
+          <a:chOff x="0" y="0"/>
+          <a:chExt cx="0" cy="0"/>
+        </a:xfrm>
+      </p:grpSpPr>
+      <p:sp useBgFill="1">
+        <p:nvSpPr>
+          <p:cNvPr id="7" name="Rectangle 6">
+            <a:extLst>
+              <a:ext uri="{FF2B5EF4-FFF2-40B4-BE49-F238E27FC236}">
+                <a16:creationId xmlns:a16="http://schemas.microsoft.com/office/drawing/2014/main" id="{62C9703D-C8F9-44AD-A7C0-C2F3871F8C1B}"/>
+              </a:ext>
+              <a:ext uri="{C183D7F6-B498-43B3-948B-1728B52AA6E4}">
+                <adec:decorative xmlns:adec="http://schemas.microsoft.com/office/drawing/2017/decorative" val="1"/>
+              </a:ext>
+            </a:extLst>
+          </p:cNvPr>
+          <p:cNvSpPr>
+            <a:spLocks noGrp="1" noRot="1" noChangeAspect="1" noMove="1" noResize="1" noEditPoints="1" noAdjustHandles="1" noChangeArrowheads="1" noChangeShapeType="1" noTextEdit="1"/>
+          </p:cNvSpPr>
+          <p:nvPr>
+            <p:extLst>
+              <p:ext uri="{386F3935-93C4-4BCD-93E2-E3B085C9AB24}">
+                <p16:designElem xmlns:p16="http://schemas.microsoft.com/office/powerpoint/2015/main" val="1"/>
+              </p:ext>
+            </p:extLst>
+          </p:nvPr>
+        </p:nvSpPr>
+        <p:spPr>
+          <a:xfrm>
+            <a:off x="0" y="0"/>
+            <a:ext cx="12192000" cy="6160168"/>
+          </a:xfrm>
+          <a:prstGeom prst="rect">
+            <a:avLst/>
+          </a:prstGeom>
+          <a:ln>
+            <a:noFill/>
+          </a:ln>
+        </p:spPr>
+        <p:style>
+          <a:lnRef idx="2">
+            <a:schemeClr val="accent1">
+              <a:shade val="50000"/>
+            </a:schemeClr>
+          </a:lnRef>
+          <a:fillRef idx="1">
+            <a:schemeClr val="accent1"/>
+          </a:fillRef>
+          <a:effectRef idx="0">
+            <a:schemeClr val="accent1"/>
+          </a:effectRef>
+          <a:fontRef idx="minor">
+            <a:schemeClr val="lt1"/>
+          </a:fontRef>
+        </p:style>
+        <p:txBody>
+          <a:bodyPr rtlCol="0" anchor="ctr"/>
+          <a:lstStyle/>
+          <a:p>
+            <a:pPr algn="ctr"/>
+            <a:endParaRPr lang="en-US"/>
+          </a:p>
+        </p:txBody>
+      </p:sp>
+      <p:pic>
+        <p:nvPicPr>
+          <p:cNvPr id="2" name="Imagen 1" descr="Captura de pantalla de un celular con letras&#10;&#10;Descripción generada automáticamente">
+            <a:extLst>
+              <a:ext uri="{FF2B5EF4-FFF2-40B4-BE49-F238E27FC236}">
+                <a16:creationId xmlns:a16="http://schemas.microsoft.com/office/drawing/2014/main" id="{40C6E255-564F-4C7B-AE2D-5D129443068D}"/>
+              </a:ext>
+            </a:extLst>
+          </p:cNvPr>
+          <p:cNvPicPr>
+            <a:picLocks noChangeAspect="1"/>
+          </p:cNvPicPr>
+          <p:nvPr/>
+        </p:nvPicPr>
+        <p:blipFill>
+          <a:blip r:embed="rId2"/>
+          <a:stretch>
+            <a:fillRect/>
+          </a:stretch>
+        </p:blipFill>
+        <p:spPr>
+          <a:xfrm>
+            <a:off x="1764236" y="643467"/>
+            <a:ext cx="8663528" cy="4873234"/>
+          </a:xfrm>
+          <a:prstGeom prst="rect">
+            <a:avLst/>
+          </a:prstGeom>
+        </p:spPr>
+      </p:pic>
+    </p:spTree>
+    <p:extLst>
+      <p:ext uri="{BB962C8B-B14F-4D97-AF65-F5344CB8AC3E}">
+        <p14:creationId xmlns:p14="http://schemas.microsoft.com/office/powerpoint/2010/main" val="1055775224"/>
+      </p:ext>
+    </p:extLst>
+  </p:cSld>
+  <p:clrMapOvr>
+    <a:masterClrMapping/>
+  </p:clrMapOvr>
+</p:sld>
+</file>
+
 <file path=ppt/theme/theme1.xml><?xml version="1.0" encoding="utf-8"?>
 <a:theme xmlns:a="http://schemas.openxmlformats.org/drawingml/2006/main" name="Galería">
   <a:themeElements>

</xml_diff>